<commit_message>
Updated README, worksheet and slides
</commit_message>
<xml_diff>
--- a/DSI Project 1 - JK.pptx
+++ b/DSI Project 1 - JK.pptx
@@ -5,13 +5,14 @@
     <p:sldMasterId id="2147483648" r:id="rId1"/>
   </p:sldMasterIdLst>
   <p:notesMasterIdLst>
-    <p:notesMasterId r:id="rId6"/>
+    <p:notesMasterId r:id="rId7"/>
   </p:notesMasterIdLst>
   <p:sldIdLst>
     <p:sldId id="256" r:id="rId2"/>
     <p:sldId id="257" r:id="rId3"/>
-    <p:sldId id="258" r:id="rId4"/>
-    <p:sldId id="260" r:id="rId5"/>
+    <p:sldId id="261" r:id="rId4"/>
+    <p:sldId id="258" r:id="rId5"/>
+    <p:sldId id="260" r:id="rId6"/>
   </p:sldIdLst>
   <p:sldSz cx="12192000" cy="6858000"/>
   <p:notesSz cx="6858000" cy="9144000"/>
@@ -533,7 +534,7 @@
           <a:p>
             <a:fld id="{6F7AD43C-B7B0-4DF7-B437-C42E02A40C95}" type="slidenum">
               <a:rPr lang="en-SG" smtClean="0"/>
-              <a:t>3</a:t>
+              <a:t>4</a:t>
             </a:fld>
             <a:endParaRPr lang="en-SG"/>
           </a:p>
@@ -3987,95 +3988,386 @@
           <a:chExt cx="0" cy="0"/>
         </a:xfrm>
       </p:grpSpPr>
-      <p:sp>
-        <p:nvSpPr>
-          <p:cNvPr id="2" name="Title 1">
-            <a:extLst>
-              <a:ext uri="{FF2B5EF4-FFF2-40B4-BE49-F238E27FC236}">
-                <a16:creationId xmlns:a16="http://schemas.microsoft.com/office/drawing/2014/main" id="{F0ADDD38-649F-4D9A-B00B-2EDB0E769722}"/>
-              </a:ext>
-            </a:extLst>
-          </p:cNvPr>
-          <p:cNvSpPr>
-            <a:spLocks noGrp="1"/>
-          </p:cNvSpPr>
-          <p:nvPr>
-            <p:ph type="title"/>
-          </p:nvPr>
-        </p:nvSpPr>
-        <p:spPr/>
-        <p:txBody>
-          <a:bodyPr/>
-          <a:lstStyle/>
-          <a:p>
-            <a:r>
-              <a:rPr lang="en-US" dirty="0"/>
-              <a:t>Should you take SAT? ACT? Or both?</a:t>
-            </a:r>
-            <a:endParaRPr lang="en-SG" dirty="0"/>
-          </a:p>
-        </p:txBody>
-      </p:sp>
-      <p:sp>
-        <p:nvSpPr>
-          <p:cNvPr id="3" name="Content Placeholder 2">
-            <a:extLst>
-              <a:ext uri="{FF2B5EF4-FFF2-40B4-BE49-F238E27FC236}">
-                <a16:creationId xmlns:a16="http://schemas.microsoft.com/office/drawing/2014/main" id="{2B46795B-F34C-4A88-848A-14166B72548E}"/>
-              </a:ext>
-            </a:extLst>
-          </p:cNvPr>
-          <p:cNvSpPr>
-            <a:spLocks noGrp="1"/>
-          </p:cNvSpPr>
-          <p:nvPr>
-            <p:ph idx="1"/>
-          </p:nvPr>
-        </p:nvSpPr>
-        <p:spPr/>
-        <p:txBody>
-          <a:bodyPr>
-            <a:normAutofit/>
-          </a:bodyPr>
-          <a:lstStyle/>
-          <a:p>
-            <a:pPr marL="0" indent="0">
-              <a:buNone/>
-            </a:pPr>
-            <a:r>
-              <a:rPr lang="en-US" sz="3600" dirty="0"/>
-              <a:t>Take both ACT and SAT to increase the odds of complementing your </a:t>
-            </a:r>
-            <a:r>
-              <a:rPr lang="en-US" sz="3600"/>
-              <a:t>GPA score</a:t>
-            </a:r>
-            <a:endParaRPr lang="en-US" sz="3600" dirty="0"/>
-          </a:p>
-          <a:p>
-            <a:pPr lvl="1"/>
-            <a:r>
-              <a:rPr lang="en-US" sz="3200" dirty="0"/>
-              <a:t>ACT has ended the self-paced timing for students with the extended-time accommodation. Use SAT as a backup</a:t>
-            </a:r>
-          </a:p>
-          <a:p>
-            <a:pPr lvl="1"/>
-            <a:endParaRPr lang="en-US" sz="3200" dirty="0"/>
-          </a:p>
-          <a:p>
-            <a:pPr lvl="1"/>
-            <a:r>
-              <a:rPr lang="en-US" sz="3200" dirty="0"/>
-              <a:t>The difficulty levels of the tests could vary every year. Take both SAT and ACT to increase the odds of getting a higher score</a:t>
-            </a:r>
-          </a:p>
-        </p:txBody>
-      </p:sp>
+      <p:pic>
+        <p:nvPicPr>
+          <p:cNvPr id="1031" name="Picture 7">
+            <a:extLst>
+              <a:ext uri="{FF2B5EF4-FFF2-40B4-BE49-F238E27FC236}">
+                <a16:creationId xmlns:a16="http://schemas.microsoft.com/office/drawing/2014/main" id="{B4095845-2449-4E5A-94F6-5ABEB73A0759}"/>
+              </a:ext>
+            </a:extLst>
+          </p:cNvPr>
+          <p:cNvPicPr>
+            <a:picLocks noChangeAspect="1" noChangeArrowheads="1"/>
+          </p:cNvPicPr>
+          <p:nvPr/>
+        </p:nvPicPr>
+        <p:blipFill>
+          <a:blip r:embed="rId2">
+            <a:extLst>
+              <a:ext uri="{28A0092B-C50C-407E-A947-70E740481C1C}">
+                <a14:useLocalDpi xmlns:a14="http://schemas.microsoft.com/office/drawing/2010/main" val="0"/>
+              </a:ext>
+            </a:extLst>
+          </a:blip>
+          <a:srcRect/>
+          <a:stretch>
+            <a:fillRect/>
+          </a:stretch>
+        </p:blipFill>
+        <p:spPr bwMode="auto">
+          <a:xfrm>
+            <a:off x="4249437" y="413167"/>
+            <a:ext cx="3272518" cy="1762125"/>
+          </a:xfrm>
+          <a:prstGeom prst="rect">
+            <a:avLst/>
+          </a:prstGeom>
+          <a:noFill/>
+          <a:extLst>
+            <a:ext uri="{909E8E84-426E-40DD-AFC4-6F175D3DCCD1}">
+              <a14:hiddenFill xmlns:a14="http://schemas.microsoft.com/office/drawing/2010/main">
+                <a:solidFill>
+                  <a:srgbClr val="FFFFFF"/>
+                </a:solidFill>
+              </a14:hiddenFill>
+            </a:ext>
+          </a:extLst>
+        </p:spPr>
+      </p:pic>
+      <p:pic>
+        <p:nvPicPr>
+          <p:cNvPr id="1034" name="Picture 10">
+            <a:extLst>
+              <a:ext uri="{FF2B5EF4-FFF2-40B4-BE49-F238E27FC236}">
+                <a16:creationId xmlns:a16="http://schemas.microsoft.com/office/drawing/2014/main" id="{EE09B7B5-46C6-4C9F-AE34-6F4252701A8D}"/>
+              </a:ext>
+            </a:extLst>
+          </p:cNvPr>
+          <p:cNvPicPr>
+            <a:picLocks noChangeAspect="1" noChangeArrowheads="1"/>
+          </p:cNvPicPr>
+          <p:nvPr/>
+        </p:nvPicPr>
+        <p:blipFill>
+          <a:blip r:embed="rId3">
+            <a:extLst>
+              <a:ext uri="{28A0092B-C50C-407E-A947-70E740481C1C}">
+                <a14:useLocalDpi xmlns:a14="http://schemas.microsoft.com/office/drawing/2010/main" val="0"/>
+              </a:ext>
+            </a:extLst>
+          </a:blip>
+          <a:srcRect/>
+          <a:stretch>
+            <a:fillRect/>
+          </a:stretch>
+        </p:blipFill>
+        <p:spPr bwMode="auto">
+          <a:xfrm>
+            <a:off x="5344193" y="2287799"/>
+            <a:ext cx="2331251" cy="1883839"/>
+          </a:xfrm>
+          <a:prstGeom prst="rect">
+            <a:avLst/>
+          </a:prstGeom>
+          <a:noFill/>
+          <a:extLst>
+            <a:ext uri="{909E8E84-426E-40DD-AFC4-6F175D3DCCD1}">
+              <a14:hiddenFill xmlns:a14="http://schemas.microsoft.com/office/drawing/2010/main">
+                <a:solidFill>
+                  <a:srgbClr val="FFFFFF"/>
+                </a:solidFill>
+              </a14:hiddenFill>
+            </a:ext>
+          </a:extLst>
+        </p:spPr>
+      </p:pic>
+      <p:pic>
+        <p:nvPicPr>
+          <p:cNvPr id="1036" name="Picture 12">
+            <a:extLst>
+              <a:ext uri="{FF2B5EF4-FFF2-40B4-BE49-F238E27FC236}">
+                <a16:creationId xmlns:a16="http://schemas.microsoft.com/office/drawing/2014/main" id="{B06A5AFD-7FDE-4B84-BAED-B82D4215062B}"/>
+              </a:ext>
+            </a:extLst>
+          </p:cNvPr>
+          <p:cNvPicPr>
+            <a:picLocks noChangeAspect="1" noChangeArrowheads="1"/>
+          </p:cNvPicPr>
+          <p:nvPr/>
+        </p:nvPicPr>
+        <p:blipFill>
+          <a:blip r:embed="rId4">
+            <a:extLst>
+              <a:ext uri="{28A0092B-C50C-407E-A947-70E740481C1C}">
+                <a14:useLocalDpi xmlns:a14="http://schemas.microsoft.com/office/drawing/2010/main" val="0"/>
+              </a:ext>
+            </a:extLst>
+          </a:blip>
+          <a:srcRect/>
+          <a:stretch>
+            <a:fillRect/>
+          </a:stretch>
+        </p:blipFill>
+        <p:spPr bwMode="auto">
+          <a:xfrm>
+            <a:off x="1852200" y="166001"/>
+            <a:ext cx="2461125" cy="2029794"/>
+          </a:xfrm>
+          <a:prstGeom prst="rect">
+            <a:avLst/>
+          </a:prstGeom>
+          <a:noFill/>
+          <a:extLst>
+            <a:ext uri="{909E8E84-426E-40DD-AFC4-6F175D3DCCD1}">
+              <a14:hiddenFill xmlns:a14="http://schemas.microsoft.com/office/drawing/2010/main">
+                <a:solidFill>
+                  <a:srgbClr val="FFFFFF"/>
+                </a:solidFill>
+              </a14:hiddenFill>
+            </a:ext>
+          </a:extLst>
+        </p:spPr>
+      </p:pic>
+      <p:pic>
+        <p:nvPicPr>
+          <p:cNvPr id="1038" name="Picture 14">
+            <a:extLst>
+              <a:ext uri="{FF2B5EF4-FFF2-40B4-BE49-F238E27FC236}">
+                <a16:creationId xmlns:a16="http://schemas.microsoft.com/office/drawing/2014/main" id="{A294804D-D215-40AC-ADD8-6F6DA48A2D0D}"/>
+              </a:ext>
+            </a:extLst>
+          </p:cNvPr>
+          <p:cNvPicPr>
+            <a:picLocks noChangeAspect="1" noChangeArrowheads="1"/>
+          </p:cNvPicPr>
+          <p:nvPr/>
+        </p:nvPicPr>
+        <p:blipFill>
+          <a:blip r:embed="rId5">
+            <a:extLst>
+              <a:ext uri="{28A0092B-C50C-407E-A947-70E740481C1C}">
+                <a14:useLocalDpi xmlns:a14="http://schemas.microsoft.com/office/drawing/2010/main" val="0"/>
+              </a:ext>
+            </a:extLst>
+          </a:blip>
+          <a:srcRect/>
+          <a:stretch>
+            <a:fillRect/>
+          </a:stretch>
+        </p:blipFill>
+        <p:spPr bwMode="auto">
+          <a:xfrm>
+            <a:off x="1083811" y="2253283"/>
+            <a:ext cx="2234258" cy="1876542"/>
+          </a:xfrm>
+          <a:prstGeom prst="rect">
+            <a:avLst/>
+          </a:prstGeom>
+          <a:noFill/>
+          <a:extLst>
+            <a:ext uri="{909E8E84-426E-40DD-AFC4-6F175D3DCCD1}">
+              <a14:hiddenFill xmlns:a14="http://schemas.microsoft.com/office/drawing/2010/main">
+                <a:solidFill>
+                  <a:srgbClr val="FFFFFF"/>
+                </a:solidFill>
+              </a14:hiddenFill>
+            </a:ext>
+          </a:extLst>
+        </p:spPr>
+      </p:pic>
+      <p:pic>
+        <p:nvPicPr>
+          <p:cNvPr id="1040" name="Picture 16">
+            <a:extLst>
+              <a:ext uri="{FF2B5EF4-FFF2-40B4-BE49-F238E27FC236}">
+                <a16:creationId xmlns:a16="http://schemas.microsoft.com/office/drawing/2014/main" id="{BDCC2BCF-73D3-4AC0-8F54-561D90698C04}"/>
+              </a:ext>
+            </a:extLst>
+          </p:cNvPr>
+          <p:cNvPicPr>
+            <a:picLocks noChangeAspect="1" noChangeArrowheads="1"/>
+          </p:cNvPicPr>
+          <p:nvPr/>
+        </p:nvPicPr>
+        <p:blipFill>
+          <a:blip r:embed="rId6">
+            <a:extLst>
+              <a:ext uri="{28A0092B-C50C-407E-A947-70E740481C1C}">
+                <a14:useLocalDpi xmlns:a14="http://schemas.microsoft.com/office/drawing/2010/main" val="0"/>
+              </a:ext>
+            </a:extLst>
+          </a:blip>
+          <a:srcRect/>
+          <a:stretch>
+            <a:fillRect/>
+          </a:stretch>
+        </p:blipFill>
+        <p:spPr bwMode="auto">
+          <a:xfrm>
+            <a:off x="7521955" y="557877"/>
+            <a:ext cx="2461125" cy="1988788"/>
+          </a:xfrm>
+          <a:prstGeom prst="rect">
+            <a:avLst/>
+          </a:prstGeom>
+          <a:noFill/>
+          <a:extLst>
+            <a:ext uri="{909E8E84-426E-40DD-AFC4-6F175D3DCCD1}">
+              <a14:hiddenFill xmlns:a14="http://schemas.microsoft.com/office/drawing/2010/main">
+                <a:solidFill>
+                  <a:srgbClr val="FFFFFF"/>
+                </a:solidFill>
+              </a14:hiddenFill>
+            </a:ext>
+          </a:extLst>
+        </p:spPr>
+      </p:pic>
+      <p:pic>
+        <p:nvPicPr>
+          <p:cNvPr id="1042" name="Picture 18">
+            <a:extLst>
+              <a:ext uri="{FF2B5EF4-FFF2-40B4-BE49-F238E27FC236}">
+                <a16:creationId xmlns:a16="http://schemas.microsoft.com/office/drawing/2014/main" id="{3A3FA26E-8E7C-4C21-B555-B0F06173313C}"/>
+              </a:ext>
+            </a:extLst>
+          </p:cNvPr>
+          <p:cNvPicPr>
+            <a:picLocks noChangeAspect="1" noChangeArrowheads="1"/>
+          </p:cNvPicPr>
+          <p:nvPr/>
+        </p:nvPicPr>
+        <p:blipFill>
+          <a:blip r:embed="rId7">
+            <a:extLst>
+              <a:ext uri="{28A0092B-C50C-407E-A947-70E740481C1C}">
+                <a14:useLocalDpi xmlns:a14="http://schemas.microsoft.com/office/drawing/2010/main" val="0"/>
+              </a:ext>
+            </a:extLst>
+          </a:blip>
+          <a:srcRect/>
+          <a:stretch>
+            <a:fillRect/>
+          </a:stretch>
+        </p:blipFill>
+        <p:spPr bwMode="auto">
+          <a:xfrm>
+            <a:off x="1852200" y="4284146"/>
+            <a:ext cx="2478005" cy="2038462"/>
+          </a:xfrm>
+          <a:prstGeom prst="rect">
+            <a:avLst/>
+          </a:prstGeom>
+          <a:noFill/>
+          <a:extLst>
+            <a:ext uri="{909E8E84-426E-40DD-AFC4-6F175D3DCCD1}">
+              <a14:hiddenFill xmlns:a14="http://schemas.microsoft.com/office/drawing/2010/main">
+                <a:solidFill>
+                  <a:srgbClr val="FFFFFF"/>
+                </a:solidFill>
+              </a14:hiddenFill>
+            </a:ext>
+          </a:extLst>
+        </p:spPr>
+      </p:pic>
+      <p:pic>
+        <p:nvPicPr>
+          <p:cNvPr id="1044" name="Picture 20">
+            <a:extLst>
+              <a:ext uri="{FF2B5EF4-FFF2-40B4-BE49-F238E27FC236}">
+                <a16:creationId xmlns:a16="http://schemas.microsoft.com/office/drawing/2014/main" id="{0D6B3F37-C67A-4595-A59F-10048B66E9D2}"/>
+              </a:ext>
+            </a:extLst>
+          </p:cNvPr>
+          <p:cNvPicPr>
+            <a:picLocks noChangeAspect="1" noChangeArrowheads="1"/>
+          </p:cNvPicPr>
+          <p:nvPr/>
+        </p:nvPicPr>
+        <p:blipFill>
+          <a:blip r:embed="rId8">
+            <a:extLst>
+              <a:ext uri="{28A0092B-C50C-407E-A947-70E740481C1C}">
+                <a14:useLocalDpi xmlns:a14="http://schemas.microsoft.com/office/drawing/2010/main" val="0"/>
+              </a:ext>
+            </a:extLst>
+          </a:blip>
+          <a:srcRect/>
+          <a:stretch>
+            <a:fillRect/>
+          </a:stretch>
+        </p:blipFill>
+        <p:spPr bwMode="auto">
+          <a:xfrm>
+            <a:off x="4607359" y="4447504"/>
+            <a:ext cx="2637442" cy="2158520"/>
+          </a:xfrm>
+          <a:prstGeom prst="rect">
+            <a:avLst/>
+          </a:prstGeom>
+          <a:noFill/>
+          <a:extLst>
+            <a:ext uri="{909E8E84-426E-40DD-AFC4-6F175D3DCCD1}">
+              <a14:hiddenFill xmlns:a14="http://schemas.microsoft.com/office/drawing/2010/main">
+                <a:solidFill>
+                  <a:srgbClr val="FFFFFF"/>
+                </a:solidFill>
+              </a14:hiddenFill>
+            </a:ext>
+          </a:extLst>
+        </p:spPr>
+      </p:pic>
+      <p:pic>
+        <p:nvPicPr>
+          <p:cNvPr id="1046" name="Picture 22">
+            <a:extLst>
+              <a:ext uri="{FF2B5EF4-FFF2-40B4-BE49-F238E27FC236}">
+                <a16:creationId xmlns:a16="http://schemas.microsoft.com/office/drawing/2014/main" id="{AB054B4A-B6E6-4A97-951C-1B18D9D697AB}"/>
+              </a:ext>
+            </a:extLst>
+          </p:cNvPr>
+          <p:cNvPicPr>
+            <a:picLocks noChangeAspect="1" noChangeArrowheads="1"/>
+          </p:cNvPicPr>
+          <p:nvPr/>
+        </p:nvPicPr>
+        <p:blipFill>
+          <a:blip r:embed="rId9">
+            <a:extLst>
+              <a:ext uri="{28A0092B-C50C-407E-A947-70E740481C1C}">
+                <a14:useLocalDpi xmlns:a14="http://schemas.microsoft.com/office/drawing/2010/main" val="0"/>
+              </a:ext>
+            </a:extLst>
+          </a:blip>
+          <a:srcRect/>
+          <a:stretch>
+            <a:fillRect/>
+          </a:stretch>
+        </p:blipFill>
+        <p:spPr bwMode="auto">
+          <a:xfrm>
+            <a:off x="7787030" y="3668697"/>
+            <a:ext cx="2967790" cy="2356558"/>
+          </a:xfrm>
+          <a:prstGeom prst="rect">
+            <a:avLst/>
+          </a:prstGeom>
+          <a:noFill/>
+          <a:extLst>
+            <a:ext uri="{909E8E84-426E-40DD-AFC4-6F175D3DCCD1}">
+              <a14:hiddenFill xmlns:a14="http://schemas.microsoft.com/office/drawing/2010/main">
+                <a:solidFill>
+                  <a:srgbClr val="FFFFFF"/>
+                </a:solidFill>
+              </a14:hiddenFill>
+            </a:ext>
+          </a:extLst>
+        </p:spPr>
+      </p:pic>
     </p:spTree>
     <p:extLst>
       <p:ext uri="{BB962C8B-B14F-4D97-AF65-F5344CB8AC3E}">
-        <p14:creationId xmlns:p14="http://schemas.microsoft.com/office/powerpoint/2010/main" val="4262863832"/>
+        <p14:creationId xmlns:p14="http://schemas.microsoft.com/office/powerpoint/2010/main" val="1374048293"/>
       </p:ext>
     </p:extLst>
   </p:cSld>
@@ -4107,6 +4399,137 @@
           <p:cNvPr id="2" name="Title 1">
             <a:extLst>
               <a:ext uri="{FF2B5EF4-FFF2-40B4-BE49-F238E27FC236}">
+                <a16:creationId xmlns:a16="http://schemas.microsoft.com/office/drawing/2014/main" id="{F0ADDD38-649F-4D9A-B00B-2EDB0E769722}"/>
+              </a:ext>
+            </a:extLst>
+          </p:cNvPr>
+          <p:cNvSpPr>
+            <a:spLocks noGrp="1"/>
+          </p:cNvSpPr>
+          <p:nvPr>
+            <p:ph type="title"/>
+          </p:nvPr>
+        </p:nvSpPr>
+        <p:spPr/>
+        <p:txBody>
+          <a:bodyPr/>
+          <a:lstStyle/>
+          <a:p>
+            <a:r>
+              <a:rPr lang="en-US" dirty="0"/>
+              <a:t>Should you take SAT? ACT? Or both?</a:t>
+            </a:r>
+            <a:endParaRPr lang="en-SG" dirty="0"/>
+          </a:p>
+        </p:txBody>
+      </p:sp>
+      <p:sp>
+        <p:nvSpPr>
+          <p:cNvPr id="3" name="Content Placeholder 2">
+            <a:extLst>
+              <a:ext uri="{FF2B5EF4-FFF2-40B4-BE49-F238E27FC236}">
+                <a16:creationId xmlns:a16="http://schemas.microsoft.com/office/drawing/2014/main" id="{2B46795B-F34C-4A88-848A-14166B72548E}"/>
+              </a:ext>
+            </a:extLst>
+          </p:cNvPr>
+          <p:cNvSpPr>
+            <a:spLocks noGrp="1"/>
+          </p:cNvSpPr>
+          <p:nvPr>
+            <p:ph idx="1"/>
+          </p:nvPr>
+        </p:nvSpPr>
+        <p:spPr/>
+        <p:txBody>
+          <a:bodyPr>
+            <a:normAutofit fontScale="85000" lnSpcReduction="20000"/>
+          </a:bodyPr>
+          <a:lstStyle/>
+          <a:p>
+            <a:pPr marL="0" indent="0">
+              <a:buNone/>
+            </a:pPr>
+            <a:r>
+              <a:rPr lang="en-US" sz="3600" dirty="0"/>
+              <a:t>A slight drop in the mean specific SAT/ACT scores from 2017 to 2018 was observed, regardless of the type of test</a:t>
+            </a:r>
+          </a:p>
+          <a:p>
+            <a:pPr marL="0" indent="0">
+              <a:buNone/>
+            </a:pPr>
+            <a:endParaRPr lang="en-US" sz="3600" dirty="0"/>
+          </a:p>
+          <a:p>
+            <a:pPr lvl="1"/>
+            <a:r>
+              <a:rPr lang="en-US" sz="3300" dirty="0"/>
+              <a:t>ACT has ended the self-paced timing for students with the extended-time accommodation. Use SAT as a backup</a:t>
+            </a:r>
+          </a:p>
+          <a:p>
+            <a:pPr lvl="1"/>
+            <a:endParaRPr lang="en-US" sz="3300" dirty="0"/>
+          </a:p>
+          <a:p>
+            <a:pPr lvl="1"/>
+            <a:r>
+              <a:rPr lang="en-US" sz="3300" dirty="0"/>
+              <a:t>The difficulty levels of the tests could vary every year. An easier paper can result in lower score</a:t>
+            </a:r>
+          </a:p>
+          <a:p>
+            <a:pPr marL="0" indent="0">
+              <a:buNone/>
+            </a:pPr>
+            <a:endParaRPr lang="en-US" sz="3600" dirty="0"/>
+          </a:p>
+          <a:p>
+            <a:pPr marL="0" indent="0">
+              <a:buNone/>
+            </a:pPr>
+            <a:r>
+              <a:rPr lang="en-US" sz="3600" dirty="0"/>
+              <a:t>Take both ACT and SAT to increase the odds of complementing your GPA score</a:t>
+            </a:r>
+          </a:p>
+        </p:txBody>
+      </p:sp>
+    </p:spTree>
+    <p:extLst>
+      <p:ext uri="{BB962C8B-B14F-4D97-AF65-F5344CB8AC3E}">
+        <p14:creationId xmlns:p14="http://schemas.microsoft.com/office/powerpoint/2010/main" val="4262863832"/>
+      </p:ext>
+    </p:extLst>
+  </p:cSld>
+  <p:clrMapOvr>
+    <a:masterClrMapping/>
+  </p:clrMapOvr>
+</p:sld>
+</file>
+
+<file path=ppt/slides/slide5.xml><?xml version="1.0" encoding="utf-8"?>
+<p:sld xmlns:a="http://schemas.openxmlformats.org/drawingml/2006/main" xmlns:r="http://schemas.openxmlformats.org/officeDocument/2006/relationships" xmlns:p="http://schemas.openxmlformats.org/presentationml/2006/main">
+  <p:cSld>
+    <p:spTree>
+      <p:nvGrpSpPr>
+        <p:cNvPr id="1" name=""/>
+        <p:cNvGrpSpPr/>
+        <p:nvPr/>
+      </p:nvGrpSpPr>
+      <p:grpSpPr>
+        <a:xfrm>
+          <a:off x="0" y="0"/>
+          <a:ext cx="0" cy="0"/>
+          <a:chOff x="0" y="0"/>
+          <a:chExt cx="0" cy="0"/>
+        </a:xfrm>
+      </p:grpSpPr>
+      <p:sp>
+        <p:nvSpPr>
+          <p:cNvPr id="2" name="Title 1">
+            <a:extLst>
+              <a:ext uri="{FF2B5EF4-FFF2-40B4-BE49-F238E27FC236}">
                 <a16:creationId xmlns:a16="http://schemas.microsoft.com/office/drawing/2014/main" id="{83DD1613-5776-49AD-9AC6-D82AFF3316CB}"/>
               </a:ext>
             </a:extLst>
@@ -4149,7 +4572,9 @@
         </p:nvSpPr>
         <p:spPr/>
         <p:txBody>
-          <a:bodyPr/>
+          <a:bodyPr>
+            <a:normAutofit fontScale="92500" lnSpcReduction="10000"/>
+          </a:bodyPr>
           <a:lstStyle/>
           <a:p>
             <a:pPr marL="0" indent="0">
@@ -4159,6 +4584,12 @@
               <a:rPr lang="en-US" sz="3200" dirty="0"/>
               <a:t>Capitalize on your strength, take in states where it could demonstrate your strength</a:t>
             </a:r>
+          </a:p>
+          <a:p>
+            <a:pPr marL="0" indent="0">
+              <a:buNone/>
+            </a:pPr>
+            <a:endParaRPr lang="en-US" sz="3200" dirty="0"/>
           </a:p>
           <a:p>
             <a:pPr lvl="1"/>
@@ -4174,7 +4605,7 @@
             </a:pPr>
             <a:r>
               <a:rPr lang="en-SG" sz="2800" dirty="0"/>
-              <a:t>SAT, do in District of Columbia</a:t>
+              <a:t>SAT, do in District of Columbia (min 977)</a:t>
             </a:r>
           </a:p>
           <a:p>
@@ -4184,7 +4615,7 @@
             </a:pPr>
             <a:r>
               <a:rPr lang="en-SG" sz="2800" dirty="0"/>
-              <a:t>ACT, do in Nevada</a:t>
+              <a:t>ACT, do in Nevada (min 17.7)</a:t>
             </a:r>
           </a:p>
           <a:p>
@@ -4205,7 +4636,7 @@
             </a:pPr>
             <a:r>
               <a:rPr lang="en-SG" sz="2800" dirty="0"/>
-              <a:t>Reading, Hawaii or Utah or North Carolina</a:t>
+              <a:t>Good in Reading, do in Hawaii or Utah or North Carolina</a:t>
             </a:r>
           </a:p>
           <a:p>
@@ -4215,7 +4646,7 @@
             </a:pPr>
             <a:r>
               <a:rPr lang="en-SG" sz="2800" dirty="0"/>
-              <a:t>Math, Nevada or District of Columbia</a:t>
+              <a:t>Good in Math, do in Nevada or District of Columbia</a:t>
             </a:r>
           </a:p>
         </p:txBody>

</xml_diff>